<commit_message>
Fixed LazyInitializationException by adding @Transactional annotation on the business layer classes. Added NOTES.txt and Architecture.pptx
</commit_message>
<xml_diff>
--- a/leave-calendar-service/Architecture.pptx
+++ b/leave-calendar-service/Architecture.pptx
@@ -3288,7 +3288,6 @@
               <a:rPr lang="en-US" sz="4000" dirty="0" smtClean="0"/>
               <a:t>Business Layer Facade</a:t>
             </a:r>
-            <a:endParaRPr lang="en-US" sz="4000" dirty="0" smtClean="0"/>
           </a:p>
         </p:txBody>
       </p:sp>
@@ -3332,7 +3331,6 @@
               <a:rPr lang="en-US" sz="3200" dirty="0" smtClean="0"/>
               <a:t>Business Object (BO)</a:t>
             </a:r>
-            <a:endParaRPr lang="en-US" sz="3200" dirty="0" smtClean="0"/>
           </a:p>
         </p:txBody>
       </p:sp>
@@ -3376,7 +3374,6 @@
               <a:rPr lang="en-US" sz="4000" dirty="0" smtClean="0"/>
               <a:t>DB Layer</a:t>
             </a:r>
-            <a:endParaRPr lang="en-US" sz="4000" dirty="0" smtClean="0"/>
           </a:p>
         </p:txBody>
       </p:sp>
@@ -3420,7 +3417,6 @@
               <a:rPr lang="en-US" sz="3200" dirty="0" smtClean="0"/>
               <a:t>Value Object (VO)</a:t>
             </a:r>
-            <a:endParaRPr lang="en-US" sz="3200" dirty="0" smtClean="0"/>
           </a:p>
         </p:txBody>
       </p:sp>
@@ -3732,7 +3728,59 @@
               <a:rPr lang="en-US" sz="3200" dirty="0" smtClean="0"/>
               <a:t>DAO</a:t>
             </a:r>
-            <a:endParaRPr lang="en-US" sz="3200" dirty="0" smtClean="0"/>
+          </a:p>
+        </p:txBody>
+      </p:sp>
+      <p:sp>
+        <p:nvSpPr>
+          <p:cNvPr id="2" name="Oval Callout 1"/>
+          <p:cNvSpPr/>
+          <p:nvPr/>
+        </p:nvSpPr>
+        <p:spPr>
+          <a:xfrm>
+            <a:off x="6705603" y="3848100"/>
+            <a:ext cx="2303057" cy="685800"/>
+          </a:xfrm>
+          <a:prstGeom prst="wedgeEllipseCallout">
+            <a:avLst>
+              <a:gd name="adj1" fmla="val -113141"/>
+              <a:gd name="adj2" fmla="val 42599"/>
+            </a:avLst>
+          </a:prstGeom>
+        </p:spPr>
+        <p:style>
+          <a:lnRef idx="2">
+            <a:schemeClr val="accent1">
+              <a:shade val="50000"/>
+            </a:schemeClr>
+          </a:lnRef>
+          <a:fillRef idx="1">
+            <a:schemeClr val="accent1"/>
+          </a:fillRef>
+          <a:effectRef idx="0">
+            <a:schemeClr val="accent1"/>
+          </a:effectRef>
+          <a:fontRef idx="minor">
+            <a:schemeClr val="lt1"/>
+          </a:fontRef>
+        </p:style>
+        <p:txBody>
+          <a:bodyPr rtlCol="0" anchor="ctr"/>
+          <a:lstStyle/>
+          <a:p>
+            <a:pPr algn="ctr"/>
+            <a:r>
+              <a:rPr lang="en-US" b="1" dirty="0" smtClean="0"/>
+              <a:t>Dozer </a:t>
+            </a:r>
+          </a:p>
+          <a:p>
+            <a:pPr algn="ctr"/>
+            <a:r>
+              <a:rPr lang="en-US" b="1" dirty="0" smtClean="0"/>
+              <a:t>Bean Mapping</a:t>
+            </a:r>
           </a:p>
         </p:txBody>
       </p:sp>

</xml_diff>